<commit_message>
Add considerations for DTLS over SCTP
</commit_message>
<xml_diff>
--- a/DTLS_over_SCTP Security.pptx
+++ b/DTLS_over_SCTP Security.pptx
@@ -110,6 +110,11 @@
       </a:defRPr>
     </a:lvl9pPr>
   </p:defaultTextStyle>
+  <p:extLst>
+    <p:ext uri="{EFAFB233-063F-42B5-8137-9DF3F51BA10A}">
+      <p15:sldGuideLst xmlns:p15="http://schemas.microsoft.com/office/powerpoint/2012/main"/>
+    </p:ext>
+  </p:extLst>
 </p:presentation>
 </file>
 
@@ -260,7 +265,7 @@
           <a:p>
             <a:fld id="{89EB1FB1-8F79-4545-B575-ABDC3D4D6414}" type="datetimeFigureOut">
               <a:rPr lang="en-US" smtClean="0"/>
-              <a:t>11/23/23</a:t>
+              <a:t>11/24/23</a:t>
             </a:fld>
             <a:endParaRPr lang="en-US"/>
           </a:p>
@@ -458,7 +463,7 @@
           <a:p>
             <a:fld id="{89EB1FB1-8F79-4545-B575-ABDC3D4D6414}" type="datetimeFigureOut">
               <a:rPr lang="en-US" smtClean="0"/>
-              <a:t>11/23/23</a:t>
+              <a:t>11/24/23</a:t>
             </a:fld>
             <a:endParaRPr lang="en-US"/>
           </a:p>
@@ -666,7 +671,7 @@
           <a:p>
             <a:fld id="{89EB1FB1-8F79-4545-B575-ABDC3D4D6414}" type="datetimeFigureOut">
               <a:rPr lang="en-US" smtClean="0"/>
-              <a:t>11/23/23</a:t>
+              <a:t>11/24/23</a:t>
             </a:fld>
             <a:endParaRPr lang="en-US"/>
           </a:p>
@@ -864,7 +869,7 @@
           <a:p>
             <a:fld id="{89EB1FB1-8F79-4545-B575-ABDC3D4D6414}" type="datetimeFigureOut">
               <a:rPr lang="en-US" smtClean="0"/>
-              <a:t>11/23/23</a:t>
+              <a:t>11/24/23</a:t>
             </a:fld>
             <a:endParaRPr lang="en-US"/>
           </a:p>
@@ -1139,7 +1144,7 @@
           <a:p>
             <a:fld id="{89EB1FB1-8F79-4545-B575-ABDC3D4D6414}" type="datetimeFigureOut">
               <a:rPr lang="en-US" smtClean="0"/>
-              <a:t>11/23/23</a:t>
+              <a:t>11/24/23</a:t>
             </a:fld>
             <a:endParaRPr lang="en-US"/>
           </a:p>
@@ -1404,7 +1409,7 @@
           <a:p>
             <a:fld id="{89EB1FB1-8F79-4545-B575-ABDC3D4D6414}" type="datetimeFigureOut">
               <a:rPr lang="en-US" smtClean="0"/>
-              <a:t>11/23/23</a:t>
+              <a:t>11/24/23</a:t>
             </a:fld>
             <a:endParaRPr lang="en-US"/>
           </a:p>
@@ -1816,7 +1821,7 @@
           <a:p>
             <a:fld id="{89EB1FB1-8F79-4545-B575-ABDC3D4D6414}" type="datetimeFigureOut">
               <a:rPr lang="en-US" smtClean="0"/>
-              <a:t>11/23/23</a:t>
+              <a:t>11/24/23</a:t>
             </a:fld>
             <a:endParaRPr lang="en-US"/>
           </a:p>
@@ -1957,7 +1962,7 @@
           <a:p>
             <a:fld id="{89EB1FB1-8F79-4545-B575-ABDC3D4D6414}" type="datetimeFigureOut">
               <a:rPr lang="en-US" smtClean="0"/>
-              <a:t>11/23/23</a:t>
+              <a:t>11/24/23</a:t>
             </a:fld>
             <a:endParaRPr lang="en-US"/>
           </a:p>
@@ -2070,7 +2075,7 @@
           <a:p>
             <a:fld id="{89EB1FB1-8F79-4545-B575-ABDC3D4D6414}" type="datetimeFigureOut">
               <a:rPr lang="en-US" smtClean="0"/>
-              <a:t>11/23/23</a:t>
+              <a:t>11/24/23</a:t>
             </a:fld>
             <a:endParaRPr lang="en-US"/>
           </a:p>
@@ -2381,7 +2386,7 @@
           <a:p>
             <a:fld id="{89EB1FB1-8F79-4545-B575-ABDC3D4D6414}" type="datetimeFigureOut">
               <a:rPr lang="en-US" smtClean="0"/>
-              <a:t>11/23/23</a:t>
+              <a:t>11/24/23</a:t>
             </a:fld>
             <a:endParaRPr lang="en-US"/>
           </a:p>
@@ -2669,7 +2674,7 @@
           <a:p>
             <a:fld id="{89EB1FB1-8F79-4545-B575-ABDC3D4D6414}" type="datetimeFigureOut">
               <a:rPr lang="en-US" smtClean="0"/>
-              <a:t>11/23/23</a:t>
+              <a:t>11/24/23</a:t>
             </a:fld>
             <a:endParaRPr lang="en-US"/>
           </a:p>
@@ -2910,7 +2915,7 @@
           <a:p>
             <a:fld id="{89EB1FB1-8F79-4545-B575-ABDC3D4D6414}" type="datetimeFigureOut">
               <a:rPr lang="en-US" smtClean="0"/>
-              <a:t>11/23/23</a:t>
+              <a:t>11/24/23</a:t>
             </a:fld>
             <a:endParaRPr lang="en-US"/>
           </a:p>
@@ -3731,7 +3736,15 @@
             <a:pPr lvl="1"/>
             <a:r>
               <a:rPr lang="en-US" dirty="0"/>
-              <a:t>Applicable for reliable communication (ordered and unordered).</a:t>
+              <a:t>Applicable for reliable communication (ordered and </a:t>
+            </a:r>
+            <a:r>
+              <a:rPr lang="en-US"/>
+              <a:t>(limited) unordered</a:t>
+            </a:r>
+            <a:r>
+              <a:rPr lang="en-US" dirty="0"/>
+              <a:t>).</a:t>
             </a:r>
           </a:p>
           <a:p>

</xml_diff>